<commit_message>
Aggiunti UML alla presentazione
</commit_message>
<xml_diff>
--- a/MiscellaneousFile/presentazione_progetto.pptx
+++ b/MiscellaneousFile/presentazione_progetto.pptx
@@ -10,9 +10,13 @@
     <p:sldId id="258" r:id="rId4"/>
     <p:sldId id="259" r:id="rId5"/>
     <p:sldId id="260" r:id="rId6"/>
-    <p:sldId id="263" r:id="rId7"/>
-    <p:sldId id="261" r:id="rId8"/>
-    <p:sldId id="262" r:id="rId9"/>
+    <p:sldId id="267" r:id="rId7"/>
+    <p:sldId id="263" r:id="rId8"/>
+    <p:sldId id="265" r:id="rId9"/>
+    <p:sldId id="261" r:id="rId10"/>
+    <p:sldId id="266" r:id="rId11"/>
+    <p:sldId id="262" r:id="rId12"/>
+    <p:sldId id="264" r:id="rId13"/>
   </p:sldIdLst>
   <p:sldSz cx="12192000" cy="6858000"/>
   <p:notesSz cx="6858000" cy="9144000"/>
@@ -288,7 +292,7 @@
           <a:p>
             <a:fld id="{52B3FE35-3F84-4E3C-B8D2-EA463851FCA1}" type="datetimeFigureOut">
               <a:rPr lang="it-IT" smtClean="0"/>
-              <a:t>18/06/2018</a:t>
+              <a:t>25/06/2018</a:t>
             </a:fld>
             <a:endParaRPr lang="it-IT"/>
           </a:p>
@@ -618,7 +622,7 @@
           <a:p>
             <a:fld id="{52B3FE35-3F84-4E3C-B8D2-EA463851FCA1}" type="datetimeFigureOut">
               <a:rPr lang="it-IT" smtClean="0"/>
-              <a:t>18/06/2018</a:t>
+              <a:t>25/06/2018</a:t>
             </a:fld>
             <a:endParaRPr lang="it-IT"/>
           </a:p>
@@ -798,7 +802,7 @@
           <a:p>
             <a:fld id="{52B3FE35-3F84-4E3C-B8D2-EA463851FCA1}" type="datetimeFigureOut">
               <a:rPr lang="it-IT" smtClean="0"/>
-              <a:t>18/06/2018</a:t>
+              <a:t>25/06/2018</a:t>
             </a:fld>
             <a:endParaRPr lang="it-IT"/>
           </a:p>
@@ -968,7 +972,7 @@
           <a:p>
             <a:fld id="{52B3FE35-3F84-4E3C-B8D2-EA463851FCA1}" type="datetimeFigureOut">
               <a:rPr lang="it-IT" smtClean="0"/>
-              <a:t>18/06/2018</a:t>
+              <a:t>25/06/2018</a:t>
             </a:fld>
             <a:endParaRPr lang="it-IT"/>
           </a:p>
@@ -1245,7 +1249,7 @@
           <a:p>
             <a:fld id="{52B3FE35-3F84-4E3C-B8D2-EA463851FCA1}" type="datetimeFigureOut">
               <a:rPr lang="it-IT" smtClean="0"/>
-              <a:t>18/06/2018</a:t>
+              <a:t>25/06/2018</a:t>
             </a:fld>
             <a:endParaRPr lang="it-IT"/>
           </a:p>
@@ -1639,7 +1643,7 @@
           <a:p>
             <a:fld id="{52B3FE35-3F84-4E3C-B8D2-EA463851FCA1}" type="datetimeFigureOut">
               <a:rPr lang="it-IT" smtClean="0"/>
-              <a:t>18/06/2018</a:t>
+              <a:t>25/06/2018</a:t>
             </a:fld>
             <a:endParaRPr lang="it-IT"/>
           </a:p>
@@ -2116,7 +2120,7 @@
           <a:p>
             <a:fld id="{52B3FE35-3F84-4E3C-B8D2-EA463851FCA1}" type="datetimeFigureOut">
               <a:rPr lang="it-IT" smtClean="0"/>
-              <a:t>18/06/2018</a:t>
+              <a:t>25/06/2018</a:t>
             </a:fld>
             <a:endParaRPr lang="it-IT"/>
           </a:p>
@@ -2234,7 +2238,7 @@
           <a:p>
             <a:fld id="{52B3FE35-3F84-4E3C-B8D2-EA463851FCA1}" type="datetimeFigureOut">
               <a:rPr lang="it-IT" smtClean="0"/>
-              <a:t>18/06/2018</a:t>
+              <a:t>25/06/2018</a:t>
             </a:fld>
             <a:endParaRPr lang="it-IT"/>
           </a:p>
@@ -2329,7 +2333,7 @@
           <a:p>
             <a:fld id="{52B3FE35-3F84-4E3C-B8D2-EA463851FCA1}" type="datetimeFigureOut">
               <a:rPr lang="it-IT" smtClean="0"/>
-              <a:t>18/06/2018</a:t>
+              <a:t>25/06/2018</a:t>
             </a:fld>
             <a:endParaRPr lang="it-IT"/>
           </a:p>
@@ -2675,7 +2679,7 @@
           <a:p>
             <a:fld id="{52B3FE35-3F84-4E3C-B8D2-EA463851FCA1}" type="datetimeFigureOut">
               <a:rPr lang="it-IT" smtClean="0"/>
-              <a:t>18/06/2018</a:t>
+              <a:t>25/06/2018</a:t>
             </a:fld>
             <a:endParaRPr lang="it-IT"/>
           </a:p>
@@ -3063,7 +3067,7 @@
           <a:p>
             <a:fld id="{52B3FE35-3F84-4E3C-B8D2-EA463851FCA1}" type="datetimeFigureOut">
               <a:rPr lang="it-IT" smtClean="0"/>
-              <a:t>18/06/2018</a:t>
+              <a:t>25/06/2018</a:t>
             </a:fld>
             <a:endParaRPr lang="it-IT"/>
           </a:p>
@@ -3341,7 +3345,7 @@
           <a:p>
             <a:fld id="{52B3FE35-3F84-4E3C-B8D2-EA463851FCA1}" type="datetimeFigureOut">
               <a:rPr lang="it-IT" smtClean="0"/>
-              <a:t>18/06/2018</a:t>
+              <a:t>25/06/2018</a:t>
             </a:fld>
             <a:endParaRPr lang="it-IT"/>
           </a:p>
@@ -3923,6 +3927,217 @@
 </p:sld>
 </file>
 
+<file path=ppt/slides/slide10.xml><?xml version="1.0" encoding="utf-8"?>
+<p:sld xmlns:a="http://schemas.openxmlformats.org/drawingml/2006/main" xmlns:r="http://schemas.openxmlformats.org/officeDocument/2006/relationships" xmlns:p="http://schemas.openxmlformats.org/presentationml/2006/main">
+  <p:cSld>
+    <p:spTree>
+      <p:nvGrpSpPr>
+        <p:cNvPr id="1" name=""/>
+        <p:cNvGrpSpPr/>
+        <p:nvPr/>
+      </p:nvGrpSpPr>
+      <p:grpSpPr>
+        <a:xfrm>
+          <a:off x="0" y="0"/>
+          <a:ext cx="0" cy="0"/>
+          <a:chOff x="0" y="0"/>
+          <a:chExt cx="0" cy="0"/>
+        </a:xfrm>
+      </p:grpSpPr>
+      <p:pic>
+        <p:nvPicPr>
+          <p:cNvPr id="2" name="Immagine 1"/>
+          <p:cNvPicPr>
+            <a:picLocks noChangeAspect="1"/>
+          </p:cNvPicPr>
+          <p:nvPr/>
+        </p:nvPicPr>
+        <p:blipFill>
+          <a:blip r:embed="rId2" cstate="print">
+            <a:extLst>
+              <a:ext uri="{28A0092B-C50C-407E-A947-70E740481C1C}">
+                <a14:useLocalDpi xmlns:a14="http://schemas.microsoft.com/office/drawing/2010/main" val="0"/>
+              </a:ext>
+            </a:extLst>
+          </a:blip>
+          <a:stretch>
+            <a:fillRect/>
+          </a:stretch>
+        </p:blipFill>
+        <p:spPr>
+          <a:xfrm>
+            <a:off x="953035" y="244699"/>
+            <a:ext cx="11037195" cy="6400800"/>
+          </a:xfrm>
+          <a:prstGeom prst="rect">
+            <a:avLst/>
+          </a:prstGeom>
+        </p:spPr>
+      </p:pic>
+    </p:spTree>
+    <p:extLst>
+      <p:ext uri="{BB962C8B-B14F-4D97-AF65-F5344CB8AC3E}">
+        <p14:creationId xmlns:p14="http://schemas.microsoft.com/office/powerpoint/2010/main" val="1375758473"/>
+      </p:ext>
+    </p:extLst>
+  </p:cSld>
+  <p:clrMapOvr>
+    <a:masterClrMapping/>
+  </p:clrMapOvr>
+</p:sld>
+</file>
+
+<file path=ppt/slides/slide11.xml><?xml version="1.0" encoding="utf-8"?>
+<p:sld xmlns:a="http://schemas.openxmlformats.org/drawingml/2006/main" xmlns:r="http://schemas.openxmlformats.org/officeDocument/2006/relationships" xmlns:p="http://schemas.openxmlformats.org/presentationml/2006/main">
+  <p:cSld>
+    <p:spTree>
+      <p:nvGrpSpPr>
+        <p:cNvPr id="1" name=""/>
+        <p:cNvGrpSpPr/>
+        <p:nvPr/>
+      </p:nvGrpSpPr>
+      <p:grpSpPr>
+        <a:xfrm>
+          <a:off x="0" y="0"/>
+          <a:ext cx="0" cy="0"/>
+          <a:chOff x="0" y="0"/>
+          <a:chExt cx="0" cy="0"/>
+        </a:xfrm>
+      </p:grpSpPr>
+      <p:sp>
+        <p:nvSpPr>
+          <p:cNvPr id="2" name="Titolo 1"/>
+          <p:cNvSpPr>
+            <a:spLocks noGrp="1"/>
+          </p:cNvSpPr>
+          <p:nvPr>
+            <p:ph type="title"/>
+          </p:nvPr>
+        </p:nvSpPr>
+        <p:spPr/>
+        <p:txBody>
+          <a:bodyPr/>
+          <a:lstStyle/>
+          <a:p>
+            <a:r>
+              <a:rPr lang="it-IT" dirty="0"/>
+              <a:t>Interfaccia server</a:t>
+            </a:r>
+          </a:p>
+        </p:txBody>
+      </p:sp>
+      <p:sp>
+        <p:nvSpPr>
+          <p:cNvPr id="3" name="Segnaposto contenuto 2"/>
+          <p:cNvSpPr>
+            <a:spLocks noGrp="1"/>
+          </p:cNvSpPr>
+          <p:nvPr>
+            <p:ph idx="1"/>
+          </p:nvPr>
+        </p:nvSpPr>
+        <p:spPr/>
+        <p:txBody>
+          <a:bodyPr/>
+          <a:lstStyle/>
+          <a:p>
+            <a:r>
+              <a:rPr lang="it-IT" dirty="0"/>
+              <a:t>Visualizzazione e modifica del menù e quantità rimanenti</a:t>
+            </a:r>
+          </a:p>
+          <a:p>
+            <a:endParaRPr lang="it-IT" dirty="0"/>
+          </a:p>
+          <a:p>
+            <a:r>
+              <a:rPr lang="it-IT" dirty="0"/>
+              <a:t>Analisi dei dati statistici</a:t>
+            </a:r>
+          </a:p>
+          <a:p>
+            <a:endParaRPr lang="it-IT" dirty="0"/>
+          </a:p>
+          <a:p>
+            <a:r>
+              <a:rPr lang="it-IT" dirty="0"/>
+              <a:t>Gestione della ricarica del distributore</a:t>
+            </a:r>
+          </a:p>
+        </p:txBody>
+      </p:sp>
+    </p:spTree>
+    <p:extLst>
+      <p:ext uri="{BB962C8B-B14F-4D97-AF65-F5344CB8AC3E}">
+        <p14:creationId xmlns:p14="http://schemas.microsoft.com/office/powerpoint/2010/main" val="2457767398"/>
+      </p:ext>
+    </p:extLst>
+  </p:cSld>
+  <p:clrMapOvr>
+    <a:masterClrMapping/>
+  </p:clrMapOvr>
+</p:sld>
+</file>
+
+<file path=ppt/slides/slide12.xml><?xml version="1.0" encoding="utf-8"?>
+<p:sld xmlns:a="http://schemas.openxmlformats.org/drawingml/2006/main" xmlns:r="http://schemas.openxmlformats.org/officeDocument/2006/relationships" xmlns:p="http://schemas.openxmlformats.org/presentationml/2006/main">
+  <p:cSld>
+    <p:spTree>
+      <p:nvGrpSpPr>
+        <p:cNvPr id="1" name=""/>
+        <p:cNvGrpSpPr/>
+        <p:nvPr/>
+      </p:nvGrpSpPr>
+      <p:grpSpPr>
+        <a:xfrm>
+          <a:off x="0" y="0"/>
+          <a:ext cx="0" cy="0"/>
+          <a:chOff x="0" y="0"/>
+          <a:chExt cx="0" cy="0"/>
+        </a:xfrm>
+      </p:grpSpPr>
+      <p:pic>
+        <p:nvPicPr>
+          <p:cNvPr id="4" name="Segnaposto contenuto 3"/>
+          <p:cNvPicPr>
+            <a:picLocks noGrp="1" noChangeAspect="1"/>
+          </p:cNvPicPr>
+          <p:nvPr>
+            <p:ph idx="4294967295"/>
+          </p:nvPr>
+        </p:nvPicPr>
+        <p:blipFill>
+          <a:blip r:embed="rId2" cstate="print">
+            <a:extLst>
+              <a:ext uri="{28A0092B-C50C-407E-A947-70E740481C1C}">
+                <a14:useLocalDpi xmlns:a14="http://schemas.microsoft.com/office/drawing/2010/main" val="0"/>
+              </a:ext>
+            </a:extLst>
+          </a:blip>
+          <a:stretch>
+            <a:fillRect/>
+          </a:stretch>
+        </p:blipFill>
+        <p:spPr>
+          <a:xfrm>
+            <a:off x="1289453" y="320675"/>
+            <a:ext cx="10245725" cy="6211888"/>
+          </a:xfrm>
+        </p:spPr>
+      </p:pic>
+    </p:spTree>
+    <p:extLst>
+      <p:ext uri="{BB962C8B-B14F-4D97-AF65-F5344CB8AC3E}">
+        <p14:creationId xmlns:p14="http://schemas.microsoft.com/office/powerpoint/2010/main" val="846856355"/>
+      </p:ext>
+    </p:extLst>
+  </p:cSld>
+  <p:clrMapOvr>
+    <a:masterClrMapping/>
+  </p:clrMapOvr>
+</p:sld>
+</file>
+
 <file path=ppt/slides/slide2.xml><?xml version="1.0" encoding="utf-8"?>
 <p:sld xmlns:a="http://schemas.openxmlformats.org/drawingml/2006/main" xmlns:r="http://schemas.openxmlformats.org/officeDocument/2006/relationships" xmlns:p="http://schemas.openxmlformats.org/presentationml/2006/main">
   <p:cSld>
@@ -4412,92 +4627,40 @@
           <a:chExt cx="0" cy="0"/>
         </a:xfrm>
       </p:grpSpPr>
-      <p:sp>
-        <p:nvSpPr>
-          <p:cNvPr id="2" name="Titolo 1"/>
-          <p:cNvSpPr>
-            <a:spLocks noGrp="1"/>
-          </p:cNvSpPr>
-          <p:nvPr>
-            <p:ph type="title"/>
-          </p:nvPr>
-        </p:nvSpPr>
-        <p:spPr/>
-        <p:txBody>
-          <a:bodyPr/>
-          <a:lstStyle/>
-          <a:p>
-            <a:r>
-              <a:rPr lang="it-IT" dirty="0"/>
-              <a:t>Interfaccia del distributore</a:t>
-            </a:r>
-          </a:p>
-        </p:txBody>
-      </p:sp>
-      <p:sp>
-        <p:nvSpPr>
-          <p:cNvPr id="3" name="Segnaposto contenuto 2"/>
-          <p:cNvSpPr>
-            <a:spLocks noGrp="1"/>
-          </p:cNvSpPr>
-          <p:nvPr>
-            <p:ph idx="1"/>
-          </p:nvPr>
-        </p:nvSpPr>
-        <p:spPr/>
-        <p:txBody>
-          <a:bodyPr/>
-          <a:lstStyle/>
-          <a:p>
-            <a:r>
-              <a:rPr lang="it-IT" dirty="0"/>
-              <a:t>Interazione con l’utente:</a:t>
-            </a:r>
-          </a:p>
-          <a:p>
-            <a:endParaRPr lang="it-IT" dirty="0"/>
-          </a:p>
-          <a:p>
-            <a:pPr lvl="1"/>
-            <a:r>
-              <a:rPr lang="it-IT" dirty="0"/>
-              <a:t>Selezione delle bevande</a:t>
-            </a:r>
-          </a:p>
-          <a:p>
-            <a:pPr lvl="1"/>
-            <a:endParaRPr lang="it-IT" dirty="0"/>
-          </a:p>
-          <a:p>
-            <a:pPr lvl="1"/>
-            <a:r>
-              <a:rPr lang="it-IT" dirty="0"/>
-              <a:t>Inserimento della chiavetta</a:t>
-            </a:r>
-          </a:p>
-          <a:p>
-            <a:pPr lvl="1"/>
-            <a:endParaRPr lang="it-IT" dirty="0"/>
-          </a:p>
-          <a:p>
-            <a:pPr lvl="1"/>
-            <a:r>
-              <a:rPr lang="it-IT" dirty="0"/>
-              <a:t>Visualizzazione del credito e selezione dello zucchero</a:t>
-            </a:r>
-          </a:p>
-          <a:p>
-            <a:endParaRPr lang="it-IT" dirty="0"/>
-          </a:p>
-          <a:p>
-            <a:endParaRPr lang="it-IT" dirty="0"/>
-          </a:p>
-        </p:txBody>
-      </p:sp>
+      <p:pic>
+        <p:nvPicPr>
+          <p:cNvPr id="2" name="Immagine 1"/>
+          <p:cNvPicPr>
+            <a:picLocks noChangeAspect="1"/>
+          </p:cNvPicPr>
+          <p:nvPr/>
+        </p:nvPicPr>
+        <p:blipFill>
+          <a:blip r:embed="rId2">
+            <a:extLst>
+              <a:ext uri="{28A0092B-C50C-407E-A947-70E740481C1C}">
+                <a14:useLocalDpi xmlns:a14="http://schemas.microsoft.com/office/drawing/2010/main" val="0"/>
+              </a:ext>
+            </a:extLst>
+          </a:blip>
+          <a:stretch>
+            <a:fillRect/>
+          </a:stretch>
+        </p:blipFill>
+        <p:spPr>
+          <a:xfrm>
+            <a:off x="1017432" y="425004"/>
+            <a:ext cx="10805374" cy="6065948"/>
+          </a:xfrm>
+          <a:prstGeom prst="rect">
+            <a:avLst/>
+          </a:prstGeom>
+        </p:spPr>
+      </p:pic>
     </p:spTree>
     <p:extLst>
       <p:ext uri="{BB962C8B-B14F-4D97-AF65-F5344CB8AC3E}">
-        <p14:creationId xmlns:p14="http://schemas.microsoft.com/office/powerpoint/2010/main" val="12231826"/>
+        <p14:creationId xmlns:p14="http://schemas.microsoft.com/office/powerpoint/2010/main" val="1369683166"/>
       </p:ext>
     </p:extLst>
   </p:cSld>
@@ -4541,69 +4704,75 @@
           <a:p>
             <a:r>
               <a:rPr lang="it-IT" dirty="0"/>
-              <a:t>Comunicazione </a:t>
-            </a:r>
-            <a:r>
-              <a:rPr lang="it-IT" dirty="0" err="1"/>
-              <a:t>client-server</a:t>
-            </a:r>
+              <a:t>Interfaccia del distributore</a:t>
+            </a:r>
+          </a:p>
+        </p:txBody>
+      </p:sp>
+      <p:sp>
+        <p:nvSpPr>
+          <p:cNvPr id="3" name="Segnaposto contenuto 2"/>
+          <p:cNvSpPr>
+            <a:spLocks noGrp="1"/>
+          </p:cNvSpPr>
+          <p:nvPr>
+            <p:ph idx="1"/>
+          </p:nvPr>
+        </p:nvSpPr>
+        <p:spPr/>
+        <p:txBody>
+          <a:bodyPr/>
+          <a:lstStyle/>
+          <a:p>
+            <a:r>
+              <a:rPr lang="it-IT" dirty="0"/>
+              <a:t>Interazione con l’utente:</a:t>
+            </a:r>
+          </a:p>
+          <a:p>
             <a:endParaRPr lang="it-IT" dirty="0"/>
           </a:p>
-        </p:txBody>
-      </p:sp>
-      <p:sp>
-        <p:nvSpPr>
-          <p:cNvPr id="3" name="Segnaposto contenuto 2"/>
-          <p:cNvSpPr>
-            <a:spLocks noGrp="1"/>
-          </p:cNvSpPr>
-          <p:nvPr>
-            <p:ph idx="1"/>
-          </p:nvPr>
-        </p:nvSpPr>
-        <p:spPr/>
-        <p:txBody>
-          <a:bodyPr/>
-          <a:lstStyle/>
-          <a:p>
+          <a:p>
+            <a:pPr lvl="1"/>
             <a:r>
               <a:rPr lang="it-IT" dirty="0"/>
-              <a:t>Funzionalità del server</a:t>
-            </a:r>
-          </a:p>
-          <a:p>
+              <a:t>Selezione delle bevande</a:t>
+            </a:r>
+          </a:p>
+          <a:p>
+            <a:pPr lvl="1"/>
             <a:endParaRPr lang="it-IT" dirty="0"/>
           </a:p>
           <a:p>
+            <a:pPr lvl="1"/>
             <a:r>
               <a:rPr lang="it-IT" dirty="0"/>
-              <a:t>Gestione di più client</a:t>
-            </a:r>
-          </a:p>
-          <a:p>
+              <a:t>Inserimento della chiavetta</a:t>
+            </a:r>
+          </a:p>
+          <a:p>
+            <a:pPr lvl="1"/>
             <a:endParaRPr lang="it-IT" dirty="0"/>
           </a:p>
           <a:p>
+            <a:pPr lvl="1"/>
             <a:r>
               <a:rPr lang="it-IT" dirty="0"/>
-              <a:t>Invio e ricezione dei dati</a:t>
+              <a:t>Visualizzazione del credito e selezione dello zucchero</a:t>
             </a:r>
           </a:p>
           <a:p>
             <a:endParaRPr lang="it-IT" dirty="0"/>
           </a:p>
           <a:p>
-            <a:r>
-              <a:rPr lang="it-IT" dirty="0"/>
-              <a:t>Modifica dei file di testo</a:t>
-            </a:r>
+            <a:endParaRPr lang="it-IT" dirty="0"/>
           </a:p>
         </p:txBody>
       </p:sp>
     </p:spTree>
     <p:extLst>
       <p:ext uri="{BB962C8B-B14F-4D97-AF65-F5344CB8AC3E}">
-        <p14:creationId xmlns:p14="http://schemas.microsoft.com/office/powerpoint/2010/main" val="1251445603"/>
+        <p14:creationId xmlns:p14="http://schemas.microsoft.com/office/powerpoint/2010/main" val="12231826"/>
       </p:ext>
     </p:extLst>
   </p:cSld>
@@ -4630,72 +4799,146 @@
           <a:chExt cx="0" cy="0"/>
         </a:xfrm>
       </p:grpSpPr>
-      <p:sp>
-        <p:nvSpPr>
-          <p:cNvPr id="2" name="Titolo 1"/>
-          <p:cNvSpPr>
-            <a:spLocks noGrp="1"/>
-          </p:cNvSpPr>
-          <p:nvPr>
-            <p:ph type="title"/>
-          </p:nvPr>
-        </p:nvSpPr>
-        <p:spPr/>
-        <p:txBody>
-          <a:bodyPr/>
-          <a:lstStyle/>
-          <a:p>
-            <a:r>
-              <a:rPr lang="it-IT" dirty="0"/>
-              <a:t>Interfaccia server</a:t>
-            </a:r>
-          </a:p>
-        </p:txBody>
-      </p:sp>
-      <p:sp>
-        <p:nvSpPr>
-          <p:cNvPr id="3" name="Segnaposto contenuto 2"/>
-          <p:cNvSpPr>
-            <a:spLocks noGrp="1"/>
-          </p:cNvSpPr>
-          <p:nvPr>
-            <p:ph idx="1"/>
-          </p:nvPr>
-        </p:nvSpPr>
-        <p:spPr/>
-        <p:txBody>
-          <a:bodyPr/>
-          <a:lstStyle/>
-          <a:p>
-            <a:r>
-              <a:rPr lang="it-IT" dirty="0"/>
-              <a:t>Visualizzazione e modifica del menù e quantità rimanenti</a:t>
-            </a:r>
-          </a:p>
-          <a:p>
-            <a:endParaRPr lang="it-IT" dirty="0"/>
-          </a:p>
-          <a:p>
-            <a:r>
-              <a:rPr lang="it-IT" dirty="0"/>
-              <a:t>Analisi dei dati statistici</a:t>
-            </a:r>
-          </a:p>
-          <a:p>
-            <a:endParaRPr lang="it-IT" dirty="0"/>
-          </a:p>
-          <a:p>
-            <a:r>
-              <a:rPr lang="it-IT" dirty="0"/>
-              <a:t>Gestione della ricarica del distributore</a:t>
-            </a:r>
-          </a:p>
-        </p:txBody>
-      </p:sp>
+      <p:pic>
+        <p:nvPicPr>
+          <p:cNvPr id="2" name="Immagine 1"/>
+          <p:cNvPicPr>
+            <a:picLocks noChangeAspect="1"/>
+          </p:cNvPicPr>
+          <p:nvPr/>
+        </p:nvPicPr>
+        <p:blipFill>
+          <a:blip r:embed="rId2">
+            <a:extLst>
+              <a:ext uri="{28A0092B-C50C-407E-A947-70E740481C1C}">
+                <a14:useLocalDpi xmlns:a14="http://schemas.microsoft.com/office/drawing/2010/main" val="0"/>
+              </a:ext>
+            </a:extLst>
+          </a:blip>
+          <a:stretch>
+            <a:fillRect/>
+          </a:stretch>
+        </p:blipFill>
+        <p:spPr>
+          <a:xfrm>
+            <a:off x="1365161" y="318519"/>
+            <a:ext cx="10058400" cy="6120917"/>
+          </a:xfrm>
+          <a:prstGeom prst="rect">
+            <a:avLst/>
+          </a:prstGeom>
+        </p:spPr>
+      </p:pic>
     </p:spTree>
     <p:extLst>
       <p:ext uri="{BB962C8B-B14F-4D97-AF65-F5344CB8AC3E}">
-        <p14:creationId xmlns:p14="http://schemas.microsoft.com/office/powerpoint/2010/main" val="2457767398"/>
+        <p14:creationId xmlns:p14="http://schemas.microsoft.com/office/powerpoint/2010/main" val="4025217800"/>
+      </p:ext>
+    </p:extLst>
+  </p:cSld>
+  <p:clrMapOvr>
+    <a:masterClrMapping/>
+  </p:clrMapOvr>
+</p:sld>
+</file>
+
+<file path=ppt/slides/slide9.xml><?xml version="1.0" encoding="utf-8"?>
+<p:sld xmlns:a="http://schemas.openxmlformats.org/drawingml/2006/main" xmlns:r="http://schemas.openxmlformats.org/officeDocument/2006/relationships" xmlns:p="http://schemas.openxmlformats.org/presentationml/2006/main">
+  <p:cSld>
+    <p:spTree>
+      <p:nvGrpSpPr>
+        <p:cNvPr id="1" name=""/>
+        <p:cNvGrpSpPr/>
+        <p:nvPr/>
+      </p:nvGrpSpPr>
+      <p:grpSpPr>
+        <a:xfrm>
+          <a:off x="0" y="0"/>
+          <a:ext cx="0" cy="0"/>
+          <a:chOff x="0" y="0"/>
+          <a:chExt cx="0" cy="0"/>
+        </a:xfrm>
+      </p:grpSpPr>
+      <p:sp>
+        <p:nvSpPr>
+          <p:cNvPr id="2" name="Titolo 1"/>
+          <p:cNvSpPr>
+            <a:spLocks noGrp="1"/>
+          </p:cNvSpPr>
+          <p:nvPr>
+            <p:ph type="title"/>
+          </p:nvPr>
+        </p:nvSpPr>
+        <p:spPr/>
+        <p:txBody>
+          <a:bodyPr/>
+          <a:lstStyle/>
+          <a:p>
+            <a:r>
+              <a:rPr lang="it-IT" dirty="0"/>
+              <a:t>Comunicazione </a:t>
+            </a:r>
+            <a:r>
+              <a:rPr lang="it-IT" dirty="0" err="1"/>
+              <a:t>client-server</a:t>
+            </a:r>
+            <a:endParaRPr lang="it-IT" dirty="0"/>
+          </a:p>
+        </p:txBody>
+      </p:sp>
+      <p:sp>
+        <p:nvSpPr>
+          <p:cNvPr id="3" name="Segnaposto contenuto 2"/>
+          <p:cNvSpPr>
+            <a:spLocks noGrp="1"/>
+          </p:cNvSpPr>
+          <p:nvPr>
+            <p:ph idx="1"/>
+          </p:nvPr>
+        </p:nvSpPr>
+        <p:spPr/>
+        <p:txBody>
+          <a:bodyPr/>
+          <a:lstStyle/>
+          <a:p>
+            <a:r>
+              <a:rPr lang="it-IT" dirty="0"/>
+              <a:t>Funzionalità del server</a:t>
+            </a:r>
+          </a:p>
+          <a:p>
+            <a:endParaRPr lang="it-IT" dirty="0"/>
+          </a:p>
+          <a:p>
+            <a:r>
+              <a:rPr lang="it-IT" dirty="0"/>
+              <a:t>Gestione di più client</a:t>
+            </a:r>
+          </a:p>
+          <a:p>
+            <a:endParaRPr lang="it-IT" dirty="0"/>
+          </a:p>
+          <a:p>
+            <a:r>
+              <a:rPr lang="it-IT" dirty="0"/>
+              <a:t>Invio e ricezione dei dati</a:t>
+            </a:r>
+          </a:p>
+          <a:p>
+            <a:endParaRPr lang="it-IT" dirty="0"/>
+          </a:p>
+          <a:p>
+            <a:r>
+              <a:rPr lang="it-IT" dirty="0"/>
+              <a:t>Modifica dei file di testo</a:t>
+            </a:r>
+          </a:p>
+        </p:txBody>
+      </p:sp>
+    </p:spTree>
+    <p:extLst>
+      <p:ext uri="{BB962C8B-B14F-4D97-AF65-F5344CB8AC3E}">
+        <p14:creationId xmlns:p14="http://schemas.microsoft.com/office/powerpoint/2010/main" val="1251445603"/>
       </p:ext>
     </p:extLst>
   </p:cSld>

</xml_diff>

<commit_message>
Added Mladen slide to ppt
</commit_message>
<xml_diff>
--- a/MiscellaneousFile/presentazione_progetto.pptx
+++ b/MiscellaneousFile/presentazione_progetto.pptx
@@ -17,7 +17,8 @@
     <p:sldId id="261" r:id="rId11"/>
     <p:sldId id="266" r:id="rId12"/>
     <p:sldId id="262" r:id="rId13"/>
-    <p:sldId id="264" r:id="rId14"/>
+    <p:sldId id="269" r:id="rId14"/>
+    <p:sldId id="264" r:id="rId15"/>
   </p:sldIdLst>
   <p:sldSz cx="12192000" cy="6858000"/>
   <p:notesSz cx="6858000" cy="9144000"/>
@@ -4205,6 +4206,71 @@
       </p:grpSpPr>
       <p:pic>
         <p:nvPicPr>
+          <p:cNvPr id="5" name="Segnaposto contenuto 4">
+            <a:extLst>
+              <a:ext uri="{FF2B5EF4-FFF2-40B4-BE49-F238E27FC236}">
+                <a16:creationId xmlns:a16="http://schemas.microsoft.com/office/drawing/2014/main" id="{0280BB18-9D30-452B-92EB-7CE94A5F3DFB}"/>
+              </a:ext>
+            </a:extLst>
+          </p:cNvPr>
+          <p:cNvPicPr>
+            <a:picLocks noGrp="1" noChangeAspect="1"/>
+          </p:cNvPicPr>
+          <p:nvPr>
+            <p:ph idx="1"/>
+          </p:nvPr>
+        </p:nvPicPr>
+        <p:blipFill>
+          <a:blip r:embed="rId2">
+            <a:extLst>
+              <a:ext uri="{28A0092B-C50C-407E-A947-70E740481C1C}">
+                <a14:useLocalDpi xmlns:a14="http://schemas.microsoft.com/office/drawing/2010/main" val="0"/>
+              </a:ext>
+            </a:extLst>
+          </a:blip>
+          <a:stretch>
+            <a:fillRect/>
+          </a:stretch>
+        </p:blipFill>
+        <p:spPr>
+          <a:xfrm>
+            <a:off x="1642959" y="190424"/>
+            <a:ext cx="8906082" cy="6477151"/>
+          </a:xfrm>
+        </p:spPr>
+      </p:pic>
+    </p:spTree>
+    <p:extLst>
+      <p:ext uri="{BB962C8B-B14F-4D97-AF65-F5344CB8AC3E}">
+        <p14:creationId xmlns:p14="http://schemas.microsoft.com/office/powerpoint/2010/main" val="744432694"/>
+      </p:ext>
+    </p:extLst>
+  </p:cSld>
+  <p:clrMapOvr>
+    <a:masterClrMapping/>
+  </p:clrMapOvr>
+</p:sld>
+</file>
+
+<file path=ppt/slides/slide14.xml><?xml version="1.0" encoding="utf-8"?>
+<p:sld xmlns:a="http://schemas.openxmlformats.org/drawingml/2006/main" xmlns:r="http://schemas.openxmlformats.org/officeDocument/2006/relationships" xmlns:p="http://schemas.openxmlformats.org/presentationml/2006/main">
+  <p:cSld>
+    <p:spTree>
+      <p:nvGrpSpPr>
+        <p:cNvPr id="1" name=""/>
+        <p:cNvGrpSpPr/>
+        <p:nvPr/>
+      </p:nvGrpSpPr>
+      <p:grpSpPr>
+        <a:xfrm>
+          <a:off x="0" y="0"/>
+          <a:ext cx="0" cy="0"/>
+          <a:chOff x="0" y="0"/>
+          <a:chExt cx="0" cy="0"/>
+        </a:xfrm>
+      </p:grpSpPr>
+      <p:pic>
+        <p:nvPicPr>
           <p:cNvPr id="4" name="Segnaposto contenuto 3"/>
           <p:cNvPicPr>
             <a:picLocks noGrp="1" noChangeAspect="1"/>

</xml_diff>